<commit_message>
added github links in readme file.
</commit_message>
<xml_diff>
--- a/Alexa ppt.pptx
+++ b/Alexa ppt.pptx
@@ -7969,13 +7969,7 @@
               <a:rPr lang="en-US" sz="2800" dirty="0" smtClean="0">
                 <a:hlinkClick r:id="rId4"/>
               </a:rPr>
-              <a:t>https</a:t>
-            </a:r>
-            <a:r>
-              <a:rPr lang="en-US" sz="2800" dirty="0" smtClean="0">
-                <a:hlinkClick r:id="rId4"/>
-              </a:rPr>
-              <a:t>://developer.amazon.com/alexa</a:t>
+              <a:t>https://developer.amazon.com/alexa</a:t>
             </a:r>
             <a:endParaRPr lang="en-US" sz="2800" dirty="0" smtClean="0"/>
           </a:p>
@@ -8290,7 +8284,15 @@
                   <a:srgbClr val="00B0F0"/>
                 </a:solidFill>
               </a:rPr>
-              <a:t>https://github.com/Annie0sc</a:t>
+              <a:t>https://</a:t>
+            </a:r>
+            <a:r>
+              <a:rPr lang="en-US" u="sng" dirty="0" smtClean="0">
+                <a:solidFill>
+                  <a:srgbClr val="00B0F0"/>
+                </a:solidFill>
+              </a:rPr>
+              <a:t>github.com/Annie0sc</a:t>
             </a:r>
             <a:r>
               <a:rPr lang="en-US" dirty="0" smtClean="0"/>
@@ -8302,8 +8304,21 @@
                   <a:srgbClr val="00B0F0"/>
                 </a:solidFill>
               </a:rPr>
-              <a:t>https://github.com/Alekhyajaddu  </a:t>
-            </a:r>
+              <a:t>https://</a:t>
+            </a:r>
+            <a:r>
+              <a:rPr lang="en-US" u="sng" dirty="0" smtClean="0">
+                <a:solidFill>
+                  <a:srgbClr val="00B0F0"/>
+                </a:solidFill>
+              </a:rPr>
+              <a:t>github.com/Alekhyajaddu  </a:t>
+            </a:r>
+            <a:endParaRPr lang="en-US" u="sng" dirty="0" smtClean="0">
+              <a:solidFill>
+                <a:srgbClr val="00B0F0"/>
+              </a:solidFill>
+            </a:endParaRPr>
           </a:p>
           <a:p>
             <a:endParaRPr lang="en-US" dirty="0">

</xml_diff>

<commit_message>
made changes in the ppt
</commit_message>
<xml_diff>
--- a/Alexa ppt.pptx
+++ b/Alexa ppt.pptx
@@ -6704,8 +6704,8 @@
         </p:nvSpPr>
         <p:spPr>
           <a:xfrm>
-            <a:off x="10358846" y="6217920"/>
-            <a:ext cx="1476103" cy="369332"/>
+            <a:off x="9921238" y="6387738"/>
+            <a:ext cx="2050869" cy="323165"/>
           </a:xfrm>
           <a:prstGeom prst="rect">
             <a:avLst/>
@@ -6719,14 +6719,14 @@
           <a:lstStyle/>
           <a:p>
             <a:r>
-              <a:rPr lang="en-US" dirty="0">
+              <a:rPr lang="en-US" sz="1500" dirty="0" smtClean="0">
                 <a:solidFill>
                   <a:srgbClr val="FFC000"/>
                 </a:solidFill>
               </a:rPr>
-              <a:t>Alekhya</a:t>
-            </a:r>
-            <a:endParaRPr lang="en-US" dirty="0"/>
+              <a:t>Alekhya Jaddu</a:t>
+            </a:r>
+            <a:endParaRPr lang="en-US" sz="1500" dirty="0"/>
           </a:p>
         </p:txBody>
       </p:sp>
@@ -6856,8 +6856,8 @@
         </p:nvSpPr>
         <p:spPr>
           <a:xfrm>
-            <a:off x="10607040" y="6544491"/>
-            <a:ext cx="1463040" cy="369332"/>
+            <a:off x="10049853" y="6544491"/>
+            <a:ext cx="2020227" cy="323165"/>
           </a:xfrm>
           <a:prstGeom prst="rect">
             <a:avLst/>
@@ -6871,14 +6871,14 @@
           <a:lstStyle/>
           <a:p>
             <a:r>
-              <a:rPr lang="en-US" dirty="0" smtClean="0">
+              <a:rPr lang="en-US" sz="1500" dirty="0" smtClean="0">
                 <a:solidFill>
                   <a:srgbClr val="FFC000"/>
                 </a:solidFill>
               </a:rPr>
-              <a:t>Annie</a:t>
-            </a:r>
-            <a:endParaRPr lang="en-US" dirty="0">
+              <a:t>Annie Chandolu</a:t>
+            </a:r>
+            <a:endParaRPr lang="en-US" sz="1500" dirty="0">
               <a:solidFill>
                 <a:srgbClr val="FFC000"/>
               </a:solidFill>
@@ -7039,8 +7039,8 @@
         </p:nvSpPr>
         <p:spPr>
           <a:xfrm>
-            <a:off x="10633166" y="6426926"/>
-            <a:ext cx="1332411" cy="369332"/>
+            <a:off x="9888584" y="6426926"/>
+            <a:ext cx="2076994" cy="323165"/>
           </a:xfrm>
           <a:prstGeom prst="rect">
             <a:avLst/>
@@ -7054,14 +7054,14 @@
           <a:lstStyle/>
           <a:p>
             <a:r>
-              <a:rPr lang="en-US" dirty="0">
+              <a:rPr lang="en-US" sz="1500" dirty="0" smtClean="0">
                 <a:solidFill>
                   <a:srgbClr val="FFC000"/>
                 </a:solidFill>
               </a:rPr>
-              <a:t>Annie</a:t>
-            </a:r>
-            <a:endParaRPr lang="en-US" dirty="0"/>
+              <a:t>Annie Chandolu</a:t>
+            </a:r>
+            <a:endParaRPr lang="en-US" sz="1500" dirty="0"/>
           </a:p>
         </p:txBody>
       </p:sp>
@@ -7204,8 +7204,8 @@
         </p:nvSpPr>
         <p:spPr>
           <a:xfrm>
-            <a:off x="10698480" y="6439989"/>
-            <a:ext cx="1254034" cy="369332"/>
+            <a:off x="9784080" y="6439989"/>
+            <a:ext cx="2168434" cy="323165"/>
           </a:xfrm>
           <a:prstGeom prst="rect">
             <a:avLst/>
@@ -7219,14 +7219,14 @@
           <a:lstStyle/>
           <a:p>
             <a:r>
-              <a:rPr lang="en-US" dirty="0">
+              <a:rPr lang="en-US" sz="1500" dirty="0" smtClean="0">
                 <a:solidFill>
                   <a:srgbClr val="FFC000"/>
                 </a:solidFill>
               </a:rPr>
-              <a:t>Annie</a:t>
-            </a:r>
-            <a:endParaRPr lang="en-US" dirty="0"/>
+              <a:t>Annie Chandolu</a:t>
+            </a:r>
+            <a:endParaRPr lang="en-US" sz="1500" dirty="0"/>
           </a:p>
         </p:txBody>
       </p:sp>
@@ -7377,8 +7377,8 @@
         </p:nvSpPr>
         <p:spPr>
           <a:xfrm>
-            <a:off x="10554789" y="6453051"/>
-            <a:ext cx="1267097" cy="369332"/>
+            <a:off x="9692641" y="6453051"/>
+            <a:ext cx="2129246" cy="323165"/>
           </a:xfrm>
           <a:prstGeom prst="rect">
             <a:avLst/>
@@ -7392,14 +7392,14 @@
           <a:lstStyle/>
           <a:p>
             <a:r>
-              <a:rPr lang="en-US" dirty="0">
+              <a:rPr lang="en-US" sz="1500" dirty="0" smtClean="0">
                 <a:solidFill>
                   <a:srgbClr val="FFC000"/>
                 </a:solidFill>
               </a:rPr>
-              <a:t>Annie</a:t>
-            </a:r>
-            <a:endParaRPr lang="en-US" dirty="0"/>
+              <a:t>Annie Chandolu</a:t>
+            </a:r>
+            <a:endParaRPr lang="en-US" sz="1500" dirty="0"/>
           </a:p>
         </p:txBody>
       </p:sp>
@@ -7547,8 +7547,8 @@
         </p:nvSpPr>
         <p:spPr>
           <a:xfrm>
-            <a:off x="10411097" y="6400800"/>
-            <a:ext cx="1436914" cy="369332"/>
+            <a:off x="10049853" y="6400800"/>
+            <a:ext cx="1798158" cy="323165"/>
           </a:xfrm>
           <a:prstGeom prst="rect">
             <a:avLst/>
@@ -7562,14 +7562,14 @@
           <a:lstStyle/>
           <a:p>
             <a:r>
-              <a:rPr lang="en-US" dirty="0" smtClean="0">
+              <a:rPr lang="en-US" sz="1500" dirty="0" smtClean="0">
                 <a:solidFill>
                   <a:srgbClr val="FFC000"/>
                 </a:solidFill>
               </a:rPr>
-              <a:t>Pooja</a:t>
-            </a:r>
-            <a:endParaRPr lang="en-US" dirty="0">
+              <a:t>Pooja Gundu</a:t>
+            </a:r>
+            <a:endParaRPr lang="en-US" sz="1500" dirty="0">
               <a:solidFill>
                 <a:srgbClr val="FFC000"/>
               </a:solidFill>
@@ -7675,8 +7675,8 @@
         </p:nvSpPr>
         <p:spPr>
           <a:xfrm>
-            <a:off x="10620103" y="6479177"/>
-            <a:ext cx="1410788" cy="369332"/>
+            <a:off x="10202091" y="6479177"/>
+            <a:ext cx="1828800" cy="323165"/>
           </a:xfrm>
           <a:prstGeom prst="rect">
             <a:avLst/>
@@ -7690,13 +7690,18 @@
           <a:lstStyle/>
           <a:p>
             <a:r>
-              <a:rPr lang="en-US" dirty="0" smtClean="0">
+              <a:rPr lang="en-US" sz="1500" dirty="0" smtClean="0">
                 <a:solidFill>
                   <a:srgbClr val="FFC000"/>
                 </a:solidFill>
               </a:rPr>
-              <a:t>Pooja</a:t>
-            </a:r>
+              <a:t>Pooja Gundu</a:t>
+            </a:r>
+            <a:endParaRPr lang="en-US" sz="1500" dirty="0" smtClean="0">
+              <a:solidFill>
+                <a:srgbClr val="FFC000"/>
+              </a:solidFill>
+            </a:endParaRPr>
           </a:p>
         </p:txBody>
       </p:sp>
@@ -7853,8 +7858,8 @@
         </p:nvSpPr>
         <p:spPr>
           <a:xfrm>
-            <a:off x="10763794" y="6492240"/>
-            <a:ext cx="1227909" cy="369332"/>
+            <a:off x="10293532" y="6492240"/>
+            <a:ext cx="1698172" cy="323165"/>
           </a:xfrm>
           <a:prstGeom prst="rect">
             <a:avLst/>
@@ -7868,14 +7873,14 @@
           <a:lstStyle/>
           <a:p>
             <a:r>
-              <a:rPr lang="en-US" dirty="0" smtClean="0">
+              <a:rPr lang="en-US" sz="1500" dirty="0" smtClean="0">
                 <a:solidFill>
                   <a:srgbClr val="FFC000"/>
                 </a:solidFill>
               </a:rPr>
-              <a:t>Pooja</a:t>
-            </a:r>
-            <a:endParaRPr lang="en-US" dirty="0">
+              <a:t>Pooja Gundu</a:t>
+            </a:r>
+            <a:endParaRPr lang="en-US" sz="1500" dirty="0">
               <a:solidFill>
                 <a:srgbClr val="FFC000"/>
               </a:solidFill>
@@ -7993,7 +7998,7 @@
               <a:buChar char="Ø"/>
             </a:pPr>
             <a:r>
-              <a:rPr lang="en-US" sz="2800">
+              <a:rPr lang="en-US" sz="2800" dirty="0">
                 <a:hlinkClick r:id="rId3"/>
               </a:rPr>
               <a:t>https://github.com/blondiebits/code-in-5</a:t>
@@ -8210,11 +8215,9 @@
               <a:t>    </a:t>
             </a:r>
             <a:r>
-              <a:rPr lang="en-US" sz="3600" dirty="0" smtClean="0">
-                <a:solidFill>
-                  <a:schemeClr val="accent5">
-                    <a:lumMod val="50000"/>
-                  </a:schemeClr>
+              <a:rPr lang="en-US" sz="3600" b="1" dirty="0" smtClean="0">
+                <a:solidFill>
+                  <a:srgbClr val="0070C0"/>
                 </a:solidFill>
               </a:rPr>
               <a:t>TEAM MEMBERS </a:t>
@@ -8339,11 +8342,7 @@
             </a:r>
             <a:r>
               <a:rPr lang="en-US" dirty="0" smtClean="0"/>
-              <a:t>                   </a:t>
-            </a:r>
-            <a:r>
-              <a:rPr lang="en-US" dirty="0" smtClean="0"/>
-              <a:t>                                  </a:t>
+              <a:t>                                                     </a:t>
             </a:r>
             <a:r>
               <a:rPr lang="en-US" dirty="0" smtClean="0">
@@ -8369,15 +8368,7 @@
                   <a:srgbClr val="00B0F0"/>
                 </a:solidFill>
               </a:rPr>
-              <a:t>https://</a:t>
-            </a:r>
-            <a:r>
-              <a:rPr lang="en-US" u="sng" dirty="0" smtClean="0">
-                <a:solidFill>
-                  <a:srgbClr val="00B0F0"/>
-                </a:solidFill>
-              </a:rPr>
-              <a:t>github.com/Annie0sc</a:t>
+              <a:t>https://github.com/Annie0sc</a:t>
             </a:r>
             <a:r>
               <a:rPr lang="en-US" dirty="0" smtClean="0"/>
@@ -8389,21 +8380,8 @@
                   <a:srgbClr val="00B0F0"/>
                 </a:solidFill>
               </a:rPr>
-              <a:t>https://</a:t>
-            </a:r>
-            <a:r>
-              <a:rPr lang="en-US" u="sng" dirty="0" smtClean="0">
-                <a:solidFill>
-                  <a:srgbClr val="00B0F0"/>
-                </a:solidFill>
-              </a:rPr>
-              <a:t>github.com/Alekhyajaddu  </a:t>
-            </a:r>
-            <a:endParaRPr lang="en-US" u="sng" dirty="0" smtClean="0">
-              <a:solidFill>
-                <a:srgbClr val="00B0F0"/>
-              </a:solidFill>
-            </a:endParaRPr>
+              <a:t>https://github.com/Alekhyajaddu  </a:t>
+            </a:r>
           </a:p>
           <a:p>
             <a:endParaRPr lang="en-US" dirty="0">
@@ -8437,39 +8415,11 @@
                   <a:srgbClr val="FFFF00"/>
                 </a:solidFill>
               </a:rPr>
-              <a:t>             </a:t>
-            </a:r>
-            <a:r>
-              <a:rPr lang="en-US" dirty="0" err="1" smtClean="0">
-                <a:solidFill>
-                  <a:srgbClr val="FFFF00"/>
-                </a:solidFill>
-              </a:rPr>
-              <a:t>Gundu</a:t>
-            </a:r>
-            <a:r>
-              <a:rPr lang="en-US" dirty="0" smtClean="0">
-                <a:solidFill>
-                  <a:srgbClr val="FFFF00"/>
-                </a:solidFill>
-              </a:rPr>
-              <a:t> </a:t>
-            </a:r>
-            <a:r>
-              <a:rPr lang="en-US" dirty="0" smtClean="0">
-                <a:solidFill>
-                  <a:srgbClr val="FFFF00"/>
-                </a:solidFill>
-              </a:rPr>
-              <a:t>Pooja</a:t>
+              <a:t>             Gundu Pooja</a:t>
             </a:r>
             <a:r>
               <a:rPr lang="en-US" dirty="0" smtClean="0"/>
-              <a:t>                           </a:t>
-            </a:r>
-            <a:r>
-              <a:rPr lang="en-US" dirty="0" smtClean="0"/>
-              <a:t>                                         </a:t>
+              <a:t>                                                                    </a:t>
             </a:r>
             <a:r>
               <a:rPr lang="en-US" dirty="0" smtClean="0">
@@ -8953,8 +8903,8 @@
         </p:nvSpPr>
         <p:spPr>
           <a:xfrm>
-            <a:off x="10123714" y="6453051"/>
-            <a:ext cx="1463040" cy="369332"/>
+            <a:off x="9575074" y="6453051"/>
+            <a:ext cx="2011680" cy="323165"/>
           </a:xfrm>
           <a:prstGeom prst="rect">
             <a:avLst/>
@@ -8968,13 +8918,18 @@
           <a:lstStyle/>
           <a:p>
             <a:r>
-              <a:rPr lang="en-US" dirty="0" smtClean="0">
+              <a:rPr lang="en-US" sz="1500" dirty="0" smtClean="0">
                 <a:solidFill>
                   <a:srgbClr val="FFC000"/>
                 </a:solidFill>
               </a:rPr>
-              <a:t>Sushma</a:t>
-            </a:r>
+              <a:t>Sushma Chanati</a:t>
+            </a:r>
+            <a:endParaRPr lang="en-US" sz="1500" dirty="0" smtClean="0">
+              <a:solidFill>
+                <a:srgbClr val="FFC000"/>
+              </a:solidFill>
+            </a:endParaRPr>
           </a:p>
         </p:txBody>
       </p:sp>
@@ -9149,8 +9104,8 @@
         </p:nvSpPr>
         <p:spPr>
           <a:xfrm>
-            <a:off x="10502537" y="6426926"/>
-            <a:ext cx="1267097" cy="646331"/>
+            <a:off x="9640389" y="6431278"/>
+            <a:ext cx="2129245" cy="646331"/>
           </a:xfrm>
           <a:prstGeom prst="rect">
             <a:avLst/>
@@ -9164,13 +9119,26 @@
           <a:lstStyle/>
           <a:p>
             <a:r>
-              <a:rPr lang="en-US" dirty="0">
+              <a:rPr lang="en-US" sz="1500" dirty="0" smtClean="0">
                 <a:solidFill>
                   <a:srgbClr val="FFC000"/>
                 </a:solidFill>
               </a:rPr>
-              <a:t>Sushma</a:t>
-            </a:r>
+              <a:t>Sushma Chanat</a:t>
+            </a:r>
+            <a:r>
+              <a:rPr lang="en-US" dirty="0" smtClean="0">
+                <a:solidFill>
+                  <a:srgbClr val="FFC000"/>
+                </a:solidFill>
+              </a:rPr>
+              <a:t>i</a:t>
+            </a:r>
+            <a:endParaRPr lang="en-US" dirty="0">
+              <a:solidFill>
+                <a:srgbClr val="FFC000"/>
+              </a:solidFill>
+            </a:endParaRPr>
           </a:p>
           <a:p>
             <a:endParaRPr lang="en-US" dirty="0"/>
@@ -9304,8 +9272,8 @@
         </p:nvSpPr>
         <p:spPr>
           <a:xfrm>
-            <a:off x="10672354" y="6361611"/>
-            <a:ext cx="1227908" cy="369332"/>
+            <a:off x="9875520" y="6361611"/>
+            <a:ext cx="2024742" cy="323165"/>
           </a:xfrm>
           <a:prstGeom prst="rect">
             <a:avLst/>
@@ -9319,14 +9287,14 @@
           <a:lstStyle/>
           <a:p>
             <a:r>
-              <a:rPr lang="en-US" dirty="0" smtClean="0">
+              <a:rPr lang="en-US" sz="1500" dirty="0" smtClean="0">
                 <a:solidFill>
                   <a:srgbClr val="FFC000"/>
                 </a:solidFill>
               </a:rPr>
-              <a:t>Sushma</a:t>
-            </a:r>
-            <a:endParaRPr lang="en-US" dirty="0">
+              <a:t>Sushma Chanati</a:t>
+            </a:r>
+            <a:endParaRPr lang="en-US" sz="1500" dirty="0">
               <a:solidFill>
                 <a:srgbClr val="FFC000"/>
               </a:solidFill>
@@ -9522,8 +9490,8 @@
         </p:nvSpPr>
         <p:spPr>
           <a:xfrm>
-            <a:off x="10463349" y="6361612"/>
-            <a:ext cx="1384662" cy="369332"/>
+            <a:off x="9836331" y="6361612"/>
+            <a:ext cx="2011680" cy="323165"/>
           </a:xfrm>
           <a:prstGeom prst="rect">
             <a:avLst/>
@@ -9537,18 +9505,13 @@
           <a:lstStyle/>
           <a:p>
             <a:r>
-              <a:rPr lang="en-US" dirty="0" smtClean="0">
+              <a:rPr lang="en-US" sz="1500" dirty="0" smtClean="0">
                 <a:solidFill>
                   <a:srgbClr val="FFC000"/>
                 </a:solidFill>
               </a:rPr>
-              <a:t>Sushma</a:t>
-            </a:r>
-            <a:endParaRPr lang="en-US" dirty="0">
-              <a:solidFill>
-                <a:srgbClr val="FFC000"/>
-              </a:solidFill>
-            </a:endParaRPr>
+              <a:t>Sushma Chanati</a:t>
+            </a:r>
           </a:p>
         </p:txBody>
       </p:sp>
@@ -9623,7 +9586,7 @@
                   <a:srgbClr val="00B0F0"/>
                 </a:solidFill>
               </a:rPr>
-              <a:t>Important Terminology</a:t>
+              <a:t>Alexa Developer Console</a:t>
             </a:r>
             <a:endParaRPr lang="en-US" sz="4400" dirty="0" smtClean="0"/>
           </a:p>
@@ -9672,7 +9635,7 @@
                   <a:srgbClr val="00B050"/>
                 </a:solidFill>
               </a:rPr>
-              <a:t>Lambda </a:t>
+              <a:t>Build Model</a:t>
             </a:r>
             <a:endParaRPr lang="en-US" sz="2400" dirty="0" smtClean="0"/>
           </a:p>
@@ -9687,8 +9650,13 @@
                   <a:srgbClr val="00B050"/>
                 </a:solidFill>
               </a:rPr>
-              <a:t>Endpoint </a:t>
-            </a:r>
+              <a:t>Endpoints</a:t>
+            </a:r>
+            <a:endParaRPr lang="en-US" sz="2400" dirty="0" smtClean="0">
+              <a:solidFill>
+                <a:srgbClr val="00B050"/>
+              </a:solidFill>
+            </a:endParaRPr>
           </a:p>
           <a:p>
             <a:pPr marL="0" indent="0">
@@ -9862,8 +9830,8 @@
         </p:nvSpPr>
         <p:spPr>
           <a:xfrm>
-            <a:off x="10737667" y="6307574"/>
-            <a:ext cx="1358538" cy="369332"/>
+            <a:off x="10162903" y="6307574"/>
+            <a:ext cx="1933302" cy="323165"/>
           </a:xfrm>
           <a:prstGeom prst="rect">
             <a:avLst/>
@@ -9877,14 +9845,14 @@
           <a:lstStyle/>
           <a:p>
             <a:r>
-              <a:rPr lang="en-US" dirty="0" smtClean="0">
+              <a:rPr lang="en-US" sz="1500" dirty="0" smtClean="0">
                 <a:solidFill>
                   <a:srgbClr val="FFC000"/>
                 </a:solidFill>
               </a:rPr>
-              <a:t>Alekhya</a:t>
-            </a:r>
-            <a:endParaRPr lang="en-US" dirty="0">
+              <a:t>Alekhya Jaddu</a:t>
+            </a:r>
+            <a:endParaRPr lang="en-US" sz="1500" dirty="0">
               <a:solidFill>
                 <a:srgbClr val="FFC000"/>
               </a:solidFill>
@@ -10038,8 +10006,8 @@
         </p:nvSpPr>
         <p:spPr>
           <a:xfrm>
-            <a:off x="10750731" y="6479177"/>
-            <a:ext cx="1214846" cy="369332"/>
+            <a:off x="10050834" y="6479177"/>
+            <a:ext cx="1914743" cy="323165"/>
           </a:xfrm>
           <a:prstGeom prst="rect">
             <a:avLst/>
@@ -10053,14 +10021,14 @@
           <a:lstStyle/>
           <a:p>
             <a:r>
-              <a:rPr lang="en-US" dirty="0">
+              <a:rPr lang="en-US" sz="1500" dirty="0" smtClean="0">
                 <a:solidFill>
                   <a:srgbClr val="FFC000"/>
                 </a:solidFill>
               </a:rPr>
-              <a:t>Alekhya</a:t>
-            </a:r>
-            <a:endParaRPr lang="en-US" dirty="0"/>
+              <a:t>Alekhya Jaddu</a:t>
+            </a:r>
+            <a:endParaRPr lang="en-US" sz="1500" dirty="0"/>
           </a:p>
         </p:txBody>
       </p:sp>
@@ -10225,8 +10193,8 @@
         </p:nvSpPr>
         <p:spPr>
           <a:xfrm>
-            <a:off x="10411097" y="6466114"/>
-            <a:ext cx="1515292" cy="369332"/>
+            <a:off x="9980023" y="6466114"/>
+            <a:ext cx="1946366" cy="323165"/>
           </a:xfrm>
           <a:prstGeom prst="rect">
             <a:avLst/>
@@ -10240,14 +10208,14 @@
           <a:lstStyle/>
           <a:p>
             <a:r>
-              <a:rPr lang="en-US" dirty="0">
+              <a:rPr lang="en-US" sz="1500" dirty="0" smtClean="0">
                 <a:solidFill>
                   <a:srgbClr val="FFC000"/>
                 </a:solidFill>
               </a:rPr>
-              <a:t>Alekhya</a:t>
-            </a:r>
-            <a:endParaRPr lang="en-US" dirty="0"/>
+              <a:t>Alekhya Jaddu</a:t>
+            </a:r>
+            <a:endParaRPr lang="en-US" sz="1500" dirty="0"/>
           </a:p>
         </p:txBody>
       </p:sp>

</xml_diff>

<commit_message>
Final version of ppt
</commit_message>
<xml_diff>
--- a/Alexa ppt.pptx
+++ b/Alexa ppt.pptx
@@ -4391,9 +4391,16 @@
           </a:bodyPr>
           <a:lstStyle/>
           <a:p>
+            <a:endParaRPr lang="en-US" sz="2000" b="1" dirty="0" smtClean="0"/>
+          </a:p>
+          <a:p>
+            <a:r>
+              <a:rPr lang="en-US" sz="2000" b="1" dirty="0" smtClean="0"/>
+              <a:t>AWS </a:t>
+            </a:r>
             <a:r>
               <a:rPr lang="en-US" sz="2000" b="1" dirty="0"/>
-              <a:t>AWS Lambda</a:t>
+              <a:t>Lambda</a:t>
             </a:r>
             <a:r>
               <a:rPr lang="en-US" sz="2000" dirty="0"/>
@@ -4421,34 +4428,16 @@
             </a:r>
           </a:p>
           <a:p>
+            <a:endParaRPr lang="en-US" sz="2000" dirty="0" smtClean="0"/>
+          </a:p>
+          <a:p>
+            <a:r>
+              <a:rPr lang="en-US" sz="2000" dirty="0" smtClean="0"/>
+              <a:t>AWS </a:t>
+            </a:r>
             <a:r>
               <a:rPr lang="en-US" sz="2000" dirty="0"/>
-              <a:t>The purpose of Lambda</a:t>
-            </a:r>
-            <a:r>
-              <a:rPr lang="en-US" sz="2000" dirty="0" smtClean="0"/>
-              <a:t>, </a:t>
-            </a:r>
-            <a:r>
-              <a:rPr lang="en-US" sz="2000" dirty="0"/>
-              <a:t>is to simplify building smaller, on-demand applications that are responsive to events and new information. </a:t>
-            </a:r>
-            <a:endParaRPr lang="en-US" sz="2000" dirty="0" smtClean="0"/>
-          </a:p>
-          <a:p>
-            <a:r>
-              <a:rPr lang="en-US" sz="2000" dirty="0"/>
-              <a:t> AWS Lambda can also be used to automatically provision back-end services triggered by custom HTTP </a:t>
-            </a:r>
-            <a:r>
-              <a:rPr lang="en-US" sz="2000" dirty="0" smtClean="0"/>
-              <a:t>requests.</a:t>
-            </a:r>
-          </a:p>
-          <a:p>
-            <a:r>
-              <a:rPr lang="en-US" sz="2000" dirty="0"/>
-              <a:t>AWS Lambda supports code written in several languages, including Node.js, Java, and Python</a:t>
+              <a:t>Lambda supports code written in several languages, including Node.js, Java, and Python</a:t>
             </a:r>
             <a:r>
               <a:rPr lang="en-US" sz="2000" dirty="0" smtClean="0"/>
@@ -4594,6 +4583,9 @@
           </a:bodyPr>
           <a:lstStyle/>
           <a:p>
+            <a:endParaRPr lang="en-US" sz="2000" dirty="0" smtClean="0"/>
+          </a:p>
+          <a:p>
             <a:r>
               <a:rPr lang="en-US" sz="2000" dirty="0" smtClean="0"/>
               <a:t>Endpoint </a:t>
@@ -4608,37 +4600,31 @@
             </a:r>
           </a:p>
           <a:p>
+            <a:pPr marL="0" indent="0">
+              <a:buNone/>
+            </a:pPr>
+            <a:endParaRPr lang="en-US" sz="2000" dirty="0" smtClean="0"/>
+          </a:p>
+          <a:p>
+            <a:r>
+              <a:rPr lang="en-US" sz="2000" dirty="0" smtClean="0"/>
+              <a:t>The</a:t>
+            </a:r>
+            <a:r>
+              <a:rPr lang="en-US" sz="2000" dirty="0" smtClean="0"/>
+              <a:t> </a:t>
+            </a:r>
             <a:r>
               <a:rPr lang="en-US" sz="2000" dirty="0"/>
-              <a:t>At the top of the page you will now have an ARN </a:t>
+              <a:t>ARN </a:t>
             </a:r>
             <a:r>
               <a:rPr lang="en-US" sz="2000" dirty="0" smtClean="0"/>
-              <a:t>(Application Reference Number). </a:t>
-            </a:r>
-            <a:r>
-              <a:rPr lang="en-US" sz="2000" dirty="0"/>
-              <a:t>Copy this </a:t>
+              <a:t>(Application Reference Number</a:t>
             </a:r>
             <a:r>
               <a:rPr lang="en-US" sz="2000" dirty="0" smtClean="0"/>
-              <a:t>ARN.</a:t>
-            </a:r>
-          </a:p>
-          <a:p>
-            <a:r>
-              <a:rPr lang="en-US" sz="2000" dirty="0"/>
-              <a:t>Head back to the Alexa Developer Console. Under the Endpoints menu, paste in the ARN next to Default region</a:t>
-            </a:r>
-            <a:r>
-              <a:rPr lang="en-US" sz="2000" dirty="0" smtClean="0"/>
-              <a:t>.</a:t>
-            </a:r>
-          </a:p>
-          <a:p>
-            <a:r>
-              <a:rPr lang="en-US" sz="2000" dirty="0" smtClean="0"/>
-              <a:t>Save endpoints.</a:t>
+              <a:t>) is available at the top right hand side of the site, which has to be linked with the console.</a:t>
             </a:r>
             <a:endParaRPr lang="en-US" sz="2000" dirty="0"/>
           </a:p>
@@ -4776,26 +4762,43 @@
           </a:bodyPr>
           <a:lstStyle/>
           <a:p>
+            <a:endParaRPr lang="en-US" sz="2000" dirty="0" smtClean="0"/>
+          </a:p>
+          <a:p>
             <a:r>
               <a:rPr lang="en-US" sz="2000" dirty="0" smtClean="0"/>
-              <a:t>After connecting,</a:t>
+              <a:t>Lambda </a:t>
+            </a:r>
+            <a:r>
+              <a:rPr lang="en-US" sz="2000" dirty="0" smtClean="0"/>
+              <a:t>executes </a:t>
+            </a:r>
+            <a:r>
+              <a:rPr lang="en-US" sz="2000" dirty="0" smtClean="0"/>
+              <a:t>the code</a:t>
+            </a:r>
+            <a:r>
+              <a:rPr lang="en-US" sz="2000" dirty="0" smtClean="0"/>
+              <a:t> </a:t>
             </a:r>
             <a:r>
               <a:rPr lang="en-US" sz="2000" dirty="0"/>
-              <a:t> Alexa skill to a Lambda </a:t>
+              <a:t>in response to Alexa voice </a:t>
             </a:r>
             <a:r>
               <a:rPr lang="en-US" sz="2000" dirty="0" smtClean="0"/>
-              <a:t>function, Lambda executes </a:t>
-            </a:r>
-            <a:r>
-              <a:rPr lang="en-US" sz="2000" dirty="0"/>
-              <a:t>it in response to Alexa voice </a:t>
+              <a:t>interactions</a:t>
             </a:r>
             <a:r>
               <a:rPr lang="en-US" sz="2000" dirty="0" smtClean="0"/>
-              <a:t>interactions.</a:t>
-            </a:r>
+              <a:t>.</a:t>
+            </a:r>
+          </a:p>
+          <a:p>
+            <a:pPr marL="0" indent="0">
+              <a:buNone/>
+            </a:pPr>
+            <a:endParaRPr lang="en-US" sz="2000" dirty="0" smtClean="0"/>
           </a:p>
           <a:p>
             <a:r>
@@ -4804,36 +4807,11 @@
             </a:r>
             <a:r>
               <a:rPr lang="en-US" sz="2000" dirty="0" smtClean="0"/>
-              <a:t>using HTTP over TLS. </a:t>
-            </a:r>
-            <a:endParaRPr lang="en-US" sz="2000" dirty="0"/>
-          </a:p>
-          <a:p>
+              <a:t>using HTTP over </a:t>
+            </a:r>
             <a:r>
               <a:rPr lang="en-US" sz="2000" dirty="0" smtClean="0"/>
-              <a:t>When </a:t>
-            </a:r>
-            <a:r>
-              <a:rPr lang="en-US" sz="2000" dirty="0"/>
-              <a:t>a user interacts with an Alexa skill, your service receives a request containing a JSON </a:t>
-            </a:r>
-            <a:r>
-              <a:rPr lang="en-US" sz="2000" dirty="0" smtClean="0"/>
-              <a:t>body.</a:t>
-            </a:r>
-          </a:p>
-          <a:p>
-            <a:r>
-              <a:rPr lang="en-US" sz="2000" dirty="0" smtClean="0"/>
-              <a:t> </a:t>
-            </a:r>
-            <a:r>
-              <a:rPr lang="en-US" sz="2000" dirty="0"/>
-              <a:t>The request body contains the parameters necessary for the service to perform its logic and generate a JSON-formatted </a:t>
-            </a:r>
-            <a:r>
-              <a:rPr lang="en-US" sz="2000" dirty="0" smtClean="0"/>
-              <a:t>response.</a:t>
+              <a:t>TLS(Transport Layer Security). </a:t>
             </a:r>
             <a:endParaRPr lang="en-US" sz="2000" dirty="0"/>
           </a:p>
@@ -4978,50 +4956,40 @@
             <a:endParaRPr lang="en-US" sz="2000" dirty="0" smtClean="0"/>
           </a:p>
           <a:p>
+            <a:pPr marL="0" indent="0">
+              <a:buNone/>
+            </a:pPr>
+            <a:endParaRPr lang="en-US" sz="2000" dirty="0" smtClean="0"/>
+          </a:p>
+          <a:p>
             <a:r>
               <a:rPr lang="en-US" sz="2000" dirty="0" smtClean="0"/>
-              <a:t>It </a:t>
+              <a:t>Users </a:t>
             </a:r>
             <a:r>
               <a:rPr lang="en-US" sz="2000" dirty="0"/>
-              <a:t>is capable of voice interaction, music </a:t>
+              <a:t>are able to extend the Alexa capabilities by installing </a:t>
             </a:r>
             <a:r>
               <a:rPr lang="en-US" sz="2000" dirty="0" smtClean="0"/>
-              <a:t>playback, providing </a:t>
+              <a:t>“skills</a:t>
+            </a:r>
+            <a:r>
+              <a:rPr lang="en-US" sz="2000" dirty="0" smtClean="0"/>
+              <a:t>”.</a:t>
+            </a:r>
+          </a:p>
+          <a:p>
+            <a:endParaRPr lang="en-US" sz="2000" dirty="0"/>
+          </a:p>
+          <a:p>
+            <a:r>
+              <a:rPr lang="en-US" sz="2000" dirty="0" smtClean="0"/>
+              <a:t> Amazon </a:t>
             </a:r>
             <a:r>
               <a:rPr lang="en-US" sz="2000" dirty="0"/>
-              <a:t>weather, traffic, sports, and other real-time information, such as news</a:t>
-            </a:r>
-            <a:r>
-              <a:rPr lang="en-US" sz="2000" dirty="0" smtClean="0"/>
-              <a:t>.</a:t>
-            </a:r>
-            <a:endParaRPr lang="en-US" sz="2000" baseline="30000" dirty="0" smtClean="0"/>
-          </a:p>
-          <a:p>
-            <a:r>
-              <a:rPr lang="en-US" sz="2000" dirty="0"/>
-              <a:t> Alexa can also control several smart devices using itself as a </a:t>
-            </a:r>
-            <a:r>
-              <a:rPr lang="en-US" sz="2000" dirty="0" smtClean="0"/>
-              <a:t>home </a:t>
-            </a:r>
-            <a:r>
-              <a:rPr lang="en-US" sz="2000" dirty="0"/>
-              <a:t>automation system. Users are able to extend the Alexa capabilities by installing "</a:t>
-            </a:r>
-            <a:r>
-              <a:rPr lang="en-US" sz="2000" dirty="0" smtClean="0"/>
-              <a:t>skills“.</a:t>
-            </a:r>
-          </a:p>
-          <a:p>
-            <a:r>
-              <a:rPr lang="en-US" sz="2000" dirty="0"/>
-              <a:t>Amazon had over 90,000 functions ("skills") available for users to download on their Alexa-enabled </a:t>
+              <a:t>had over 90,000 functions ("skills") available for users to download on their Alexa-enabled </a:t>
             </a:r>
             <a:r>
               <a:rPr lang="en-US" sz="2000" dirty="0" smtClean="0"/>
@@ -5309,22 +5277,22 @@
           <a:bodyPr/>
           <a:lstStyle/>
           <a:p>
+            <a:endParaRPr lang="en-US" sz="2000" dirty="0" smtClean="0"/>
+          </a:p>
+          <a:p>
             <a:r>
               <a:rPr lang="en-US" sz="2000" dirty="0" smtClean="0"/>
-              <a:t>Amazon Echo is a big step forward when it comes to voice controlled technology.</a:t>
-            </a:r>
-          </a:p>
-          <a:p>
-            <a:pPr marL="0" indent="0">
-              <a:buNone/>
-            </a:pPr>
+              <a:t>Amazon </a:t>
+            </a:r>
+            <a:r>
+              <a:rPr lang="en-US" sz="2000" dirty="0" smtClean="0"/>
+              <a:t>Echo is a big step forward when it comes to voice controlled technology</a:t>
+            </a:r>
+            <a:r>
+              <a:rPr lang="en-US" sz="2000" dirty="0" smtClean="0"/>
+              <a:t>.</a:t>
+            </a:r>
             <a:endParaRPr lang="en-US" sz="2000" dirty="0" smtClean="0"/>
-          </a:p>
-          <a:p>
-            <a:r>
-              <a:rPr lang="en-US" sz="2000" dirty="0" smtClean="0"/>
-              <a:t>As the technology continues to improve you can do a lot of things with Alexa</a:t>
-            </a:r>
           </a:p>
           <a:p>
             <a:endParaRPr lang="en-US" sz="2000" dirty="0" smtClean="0"/>
@@ -6687,8 +6655,8 @@
         </p:nvSpPr>
         <p:spPr>
           <a:xfrm>
-            <a:off x="1300288" y="452719"/>
-            <a:ext cx="9404723" cy="945008"/>
+            <a:off x="1964547" y="864973"/>
+            <a:ext cx="8065079" cy="1173892"/>
           </a:xfrm>
         </p:spPr>
         <p:txBody>
@@ -6727,8 +6695,8 @@
         </p:nvSpPr>
         <p:spPr>
           <a:xfrm>
-            <a:off x="796834" y="1580606"/>
-            <a:ext cx="10633166" cy="4667793"/>
+            <a:off x="1861456" y="2554552"/>
+            <a:ext cx="8843555" cy="3361039"/>
           </a:xfrm>
         </p:spPr>
         <p:txBody>
@@ -6754,44 +6722,9 @@
             </a:r>
             <a:r>
               <a:rPr lang="en-US" sz="2400" dirty="0" smtClean="0"/>
-              <a:t>ecosystem. It enables the customers to interact with more intuitive way using </a:t>
-            </a:r>
-            <a:r>
-              <a:rPr lang="en-US" sz="2400" dirty="0" smtClean="0">
-                <a:solidFill>
-                  <a:srgbClr val="92D050"/>
-                </a:solidFill>
-              </a:rPr>
-              <a:t>VOICE.</a:t>
-            </a:r>
-          </a:p>
-          <a:p>
-            <a:pPr marL="0" indent="0">
-              <a:buNone/>
-            </a:pPr>
-            <a:endParaRPr lang="en-US" sz="2400" dirty="0"/>
-          </a:p>
-          <a:p>
-            <a:r>
-              <a:rPr lang="en-US" sz="2400" dirty="0" smtClean="0"/>
-              <a:t>Examples of these skills include the ability to play </a:t>
-            </a:r>
-            <a:r>
-              <a:rPr lang="en-US" sz="2400" dirty="0"/>
-              <a:t>M</a:t>
-            </a:r>
-            <a:r>
-              <a:rPr lang="en-US" sz="2400" dirty="0" smtClean="0"/>
-              <a:t>usic, provide </a:t>
-            </a:r>
-            <a:r>
-              <a:rPr lang="en-US" sz="2400" dirty="0"/>
-              <a:t>I</a:t>
-            </a:r>
-            <a:r>
-              <a:rPr lang="en-US" sz="2400" dirty="0" smtClean="0"/>
-              <a:t>nformation, deliver news and sports scores, tell you the weather information.</a:t>
-            </a:r>
+              <a:t>ecosystem. </a:t>
+            </a:r>
+            <a:endParaRPr lang="en-US" sz="2400" dirty="0" smtClean="0"/>
           </a:p>
           <a:p>
             <a:pPr marL="0" indent="0">
@@ -7132,7 +7065,12 @@
             <p:ph type="title"/>
           </p:nvPr>
         </p:nvSpPr>
-        <p:spPr/>
+        <p:spPr>
+          <a:xfrm>
+            <a:off x="2231136" y="964692"/>
+            <a:ext cx="7729728" cy="1188720"/>
+          </a:xfrm>
+        </p:spPr>
         <p:txBody>
           <a:bodyPr/>
           <a:lstStyle/>
@@ -7173,6 +7111,9 @@
           <a:bodyPr/>
           <a:lstStyle/>
           <a:p>
+            <a:endParaRPr lang="en-US" sz="2400" dirty="0" smtClean="0"/>
+          </a:p>
+          <a:p>
             <a:r>
               <a:rPr lang="en-US" sz="2400" dirty="0" smtClean="0"/>
               <a:t>The </a:t>
@@ -7183,8 +7124,18 @@
             </a:r>
             <a:r>
               <a:rPr lang="en-US" sz="2400" dirty="0" smtClean="0"/>
-              <a:t>Intelligence.</a:t>
-            </a:r>
+              <a:t>Intelligence</a:t>
+            </a:r>
+            <a:r>
+              <a:rPr lang="en-US" sz="2400" dirty="0" smtClean="0"/>
+              <a:t>.</a:t>
+            </a:r>
+          </a:p>
+          <a:p>
+            <a:pPr marL="0" indent="0">
+              <a:buNone/>
+            </a:pPr>
+            <a:endParaRPr lang="en-US" sz="2400" dirty="0" smtClean="0"/>
           </a:p>
           <a:p>
             <a:r>
@@ -7217,19 +7168,8 @@
             </a:r>
             <a:r>
               <a:rPr lang="en-US" sz="2400" dirty="0"/>
-              <a:t>are the two words defining the majority of devices around us today. One of the fastest growing categories with these two features lies with smart </a:t>
-            </a:r>
-            <a:r>
-              <a:rPr lang="en-US" sz="2400" dirty="0" smtClean="0"/>
-              <a:t>speakers.</a:t>
-            </a:r>
-          </a:p>
-          <a:p>
-            <a:r>
-              <a:rPr lang="en-US" sz="2400" dirty="0" smtClean="0"/>
-              <a:t>We are controlling everything via virtual assistants instead through apps.</a:t>
-            </a:r>
-            <a:endParaRPr lang="en-US" sz="2400" dirty="0"/>
+              <a:t>are the two words defining the majority of devices around us today. </a:t>
+            </a:r>
           </a:p>
         </p:txBody>
       </p:sp>
@@ -7324,8 +7264,8 @@
         </p:nvSpPr>
         <p:spPr>
           <a:xfrm>
-            <a:off x="770709" y="352698"/>
-            <a:ext cx="10162902" cy="6139542"/>
+            <a:off x="798512" y="1989438"/>
+            <a:ext cx="10162902" cy="4127157"/>
           </a:xfrm>
         </p:spPr>
         <p:txBody>
@@ -7334,112 +7274,82 @@
           </a:bodyPr>
           <a:lstStyle/>
           <a:p>
+            <a:pPr>
+              <a:buFont typeface="Wingdings" panose="05000000000000000000" pitchFamily="2" charset="2"/>
+              <a:buChar char="Ø"/>
+            </a:pPr>
+            <a:r>
+              <a:rPr lang="en-US" sz="2400" dirty="0" smtClean="0">
+                <a:solidFill>
+                  <a:srgbClr val="00B050"/>
+                </a:solidFill>
+              </a:rPr>
+              <a:t>Invocation </a:t>
+            </a:r>
+          </a:p>
+          <a:p>
+            <a:pPr>
+              <a:buFont typeface="Wingdings" panose="05000000000000000000" pitchFamily="2" charset="2"/>
+              <a:buChar char="Ø"/>
+            </a:pPr>
+            <a:r>
+              <a:rPr lang="en-US" sz="2400" dirty="0" smtClean="0">
+                <a:solidFill>
+                  <a:srgbClr val="00B050"/>
+                </a:solidFill>
+              </a:rPr>
+              <a:t>Intent </a:t>
+            </a:r>
+          </a:p>
+          <a:p>
+            <a:pPr>
+              <a:buFont typeface="Wingdings" panose="05000000000000000000" pitchFamily="2" charset="2"/>
+              <a:buChar char="Ø"/>
+            </a:pPr>
+            <a:r>
+              <a:rPr lang="en-US" sz="2400" dirty="0" smtClean="0">
+                <a:solidFill>
+                  <a:srgbClr val="00B050"/>
+                </a:solidFill>
+              </a:rPr>
+              <a:t>Build Model</a:t>
+            </a:r>
+          </a:p>
+          <a:p>
+            <a:pPr>
+              <a:buFont typeface="Wingdings" panose="05000000000000000000" pitchFamily="2" charset="2"/>
+              <a:buChar char="Ø"/>
+            </a:pPr>
+            <a:r>
+              <a:rPr lang="en-US" sz="2400" dirty="0" smtClean="0">
+                <a:solidFill>
+                  <a:srgbClr val="00B050"/>
+                </a:solidFill>
+              </a:rPr>
+              <a:t>Endpoints</a:t>
+            </a:r>
+          </a:p>
+          <a:p>
             <a:pPr marL="0" indent="0">
               <a:buNone/>
             </a:pPr>
-            <a:endParaRPr lang="en-US" dirty="0" smtClean="0"/>
-          </a:p>
-          <a:p>
-            <a:pPr marL="0" indent="0">
-              <a:buNone/>
-            </a:pPr>
-            <a:r>
-              <a:rPr lang="en-US" sz="3600" dirty="0" smtClean="0"/>
-              <a:t> </a:t>
-            </a:r>
-            <a:r>
-              <a:rPr lang="en-US" sz="4400" dirty="0" smtClean="0">
-                <a:solidFill>
-                  <a:srgbClr val="0070C0"/>
-                </a:solidFill>
-              </a:rPr>
-              <a:t>Alexa Developer Console</a:t>
+            <a:r>
+              <a:rPr lang="en-US" dirty="0" smtClean="0"/>
+              <a:t>  </a:t>
+            </a:r>
+            <a:r>
+              <a:rPr lang="en-US" sz="4000" dirty="0" smtClean="0">
+                <a:solidFill>
+                  <a:schemeClr val="tx1"/>
+                </a:solidFill>
+              </a:rPr>
+              <a:t>Important Sources</a:t>
             </a:r>
           </a:p>
           <a:p>
             <a:pPr>
               <a:buFont typeface="Wingdings" panose="05000000000000000000" pitchFamily="2" charset="2"/>
-              <a:buChar char="q"/>
-            </a:pPr>
-            <a:r>
-              <a:rPr lang="en-US" sz="2400" dirty="0">
-                <a:solidFill>
-                  <a:srgbClr val="00B050"/>
-                </a:solidFill>
-              </a:rPr>
-              <a:t>Invocation</a:t>
-            </a:r>
-            <a:r>
-              <a:rPr lang="en-US" sz="2400" dirty="0"/>
-              <a:t> </a:t>
-            </a:r>
-            <a:endParaRPr lang="en-US" sz="2400" dirty="0" smtClean="0"/>
-          </a:p>
-          <a:p>
-            <a:pPr>
-              <a:buFont typeface="Wingdings" panose="05000000000000000000" pitchFamily="2" charset="2"/>
-              <a:buChar char="q"/>
-            </a:pPr>
-            <a:r>
-              <a:rPr lang="en-US" sz="2400" dirty="0" smtClean="0">
-                <a:solidFill>
-                  <a:srgbClr val="00B050"/>
-                </a:solidFill>
-              </a:rPr>
-              <a:t>Intent </a:t>
-            </a:r>
-            <a:endParaRPr lang="en-US" sz="2400" dirty="0" smtClean="0"/>
-          </a:p>
-          <a:p>
-            <a:pPr>
-              <a:buFont typeface="Wingdings" panose="05000000000000000000" pitchFamily="2" charset="2"/>
-              <a:buChar char="q"/>
-            </a:pPr>
-            <a:r>
-              <a:rPr lang="en-US" sz="2400" dirty="0" smtClean="0">
-                <a:solidFill>
-                  <a:srgbClr val="00B050"/>
-                </a:solidFill>
-              </a:rPr>
-              <a:t>Build Model</a:t>
-            </a:r>
-            <a:endParaRPr lang="en-US" sz="2400" dirty="0" smtClean="0"/>
-          </a:p>
-          <a:p>
-            <a:pPr>
-              <a:buFont typeface="Wingdings" panose="05000000000000000000" pitchFamily="2" charset="2"/>
-              <a:buChar char="q"/>
-            </a:pPr>
-            <a:r>
-              <a:rPr lang="en-US" sz="2400" dirty="0" smtClean="0">
-                <a:solidFill>
-                  <a:srgbClr val="00B050"/>
-                </a:solidFill>
-              </a:rPr>
-              <a:t>Endpoints</a:t>
-            </a:r>
-          </a:p>
-          <a:p>
-            <a:pPr marL="0" indent="0">
-              <a:buNone/>
-            </a:pPr>
-            <a:r>
-              <a:rPr lang="en-US" dirty="0" smtClean="0"/>
-              <a:t>  </a:t>
-            </a:r>
-            <a:r>
-              <a:rPr lang="en-US" sz="4000" dirty="0" smtClean="0">
-                <a:solidFill>
-                  <a:srgbClr val="00B0F0"/>
-                </a:solidFill>
-              </a:rPr>
-              <a:t>Important Sources</a:t>
-            </a:r>
-          </a:p>
-          <a:p>
-            <a:pPr>
-              <a:buFont typeface="Wingdings" panose="05000000000000000000" pitchFamily="2" charset="2"/>
-              <a:buChar char="q"/>
+              <a:buChar char="Ø"/>
             </a:pPr>
             <a:r>
               <a:rPr lang="en-US" sz="3200" dirty="0" smtClean="0">
@@ -7459,7 +7369,7 @@
           <a:p>
             <a:pPr>
               <a:buFont typeface="Wingdings" panose="05000000000000000000" pitchFamily="2" charset="2"/>
-              <a:buChar char="q"/>
+              <a:buChar char="Ø"/>
             </a:pPr>
             <a:r>
               <a:rPr lang="en-US" sz="3200" u="sng" dirty="0" smtClean="0">
@@ -7469,19 +7379,6 @@
               </a:rPr>
               <a:t>https://aws.amazon.com</a:t>
             </a:r>
-          </a:p>
-          <a:p>
-            <a:pPr marL="0" indent="0">
-              <a:buNone/>
-            </a:pPr>
-            <a:endParaRPr lang="en-US" sz="3200" dirty="0" smtClean="0"/>
-          </a:p>
-          <a:p>
-            <a:pPr>
-              <a:buFont typeface="Wingdings" panose="05000000000000000000" pitchFamily="2" charset="2"/>
-              <a:buChar char="q"/>
-            </a:pPr>
-            <a:endParaRPr lang="en-US" dirty="0"/>
           </a:p>
         </p:txBody>
       </p:sp>
@@ -7638,6 +7535,46 @@
                 <a:srgbClr val="0070C0"/>
               </a:solidFill>
             </a:endParaRPr>
+          </a:p>
+        </p:txBody>
+      </p:sp>
+      <p:sp>
+        <p:nvSpPr>
+          <p:cNvPr id="6" name="Title 1"/>
+          <p:cNvSpPr>
+            <a:spLocks noGrp="1"/>
+          </p:cNvSpPr>
+          <p:nvPr>
+            <p:ph type="title"/>
+          </p:nvPr>
+        </p:nvSpPr>
+        <p:spPr>
+          <a:xfrm>
+            <a:off x="2130988" y="417658"/>
+            <a:ext cx="7729728" cy="1188720"/>
+          </a:xfrm>
+        </p:spPr>
+        <p:txBody>
+          <a:bodyPr/>
+          <a:lstStyle/>
+          <a:p>
+            <a:r>
+              <a:rPr lang="en-US" dirty="0" smtClean="0">
+                <a:solidFill>
+                  <a:srgbClr val="0070C0"/>
+                </a:solidFill>
+              </a:rPr>
+              <a:t>Alexa </a:t>
+            </a:r>
+            <a:r>
+              <a:rPr lang="en-US" dirty="0">
+                <a:solidFill>
+                  <a:srgbClr val="0070C0"/>
+                </a:solidFill>
+              </a:rPr>
+              <a:t>Developer Console</a:t>
+            </a:r>
+            <a:endParaRPr lang="en-US" dirty="0"/>
           </a:p>
         </p:txBody>
       </p:sp>

</xml_diff>